<commit_message>
Pré-aula 08 e Pós-aula 04.
</commit_message>
<xml_diff>
--- a/2016.2/aulas/04/ia-04.pptx
+++ b/2016.2/aulas/04/ia-04.pptx
@@ -8,7 +8,7 @@
     <p:notesMasterId r:id="rId29"/>
   </p:notesMasterIdLst>
   <p:sldIdLst>
-    <p:sldId id="506" r:id="rId2"/>
+    <p:sldId id="510" r:id="rId2"/>
     <p:sldId id="403" r:id="rId3"/>
     <p:sldId id="508" r:id="rId4"/>
     <p:sldId id="434" r:id="rId5"/>
@@ -235,7 +235,7 @@
             <a:fld id="{FBA8370A-704E-49FC-BAA9-D4AB260E2050}" type="datetimeFigureOut">
               <a:rPr lang="pt-BR" smtClean="0"/>
               <a:pPr/>
-              <a:t>04/10/2016</a:t>
+              <a:t>10/10/2016</a:t>
             </a:fld>
             <a:endParaRPr lang="pt-BR"/>
           </a:p>
@@ -688,7 +688,7 @@
             <a:fld id="{B73B5F9C-F71A-419D-83AB-F48A1180A152}" type="datetimeFigureOut">
               <a:rPr lang="pt-BR" smtClean="0"/>
               <a:pPr/>
-              <a:t>04/10/2016</a:t>
+              <a:t>10/10/2016</a:t>
             </a:fld>
             <a:endParaRPr lang="pt-BR"/>
           </a:p>
@@ -855,7 +855,7 @@
             <a:fld id="{B73B5F9C-F71A-419D-83AB-F48A1180A152}" type="datetimeFigureOut">
               <a:rPr lang="pt-BR" smtClean="0"/>
               <a:pPr/>
-              <a:t>04/10/2016</a:t>
+              <a:t>10/10/2016</a:t>
             </a:fld>
             <a:endParaRPr lang="pt-BR"/>
           </a:p>
@@ -1032,7 +1032,7 @@
             <a:fld id="{B73B5F9C-F71A-419D-83AB-F48A1180A152}" type="datetimeFigureOut">
               <a:rPr lang="pt-BR" smtClean="0"/>
               <a:pPr/>
-              <a:t>04/10/2016</a:t>
+              <a:t>10/10/2016</a:t>
             </a:fld>
             <a:endParaRPr lang="pt-BR"/>
           </a:p>
@@ -1199,7 +1199,7 @@
             <a:fld id="{B73B5F9C-F71A-419D-83AB-F48A1180A152}" type="datetimeFigureOut">
               <a:rPr lang="pt-BR" smtClean="0"/>
               <a:pPr/>
-              <a:t>04/10/2016</a:t>
+              <a:t>10/10/2016</a:t>
             </a:fld>
             <a:endParaRPr lang="pt-BR"/>
           </a:p>
@@ -1442,7 +1442,7 @@
             <a:fld id="{B73B5F9C-F71A-419D-83AB-F48A1180A152}" type="datetimeFigureOut">
               <a:rPr lang="pt-BR" smtClean="0"/>
               <a:pPr/>
-              <a:t>04/10/2016</a:t>
+              <a:t>10/10/2016</a:t>
             </a:fld>
             <a:endParaRPr lang="pt-BR"/>
           </a:p>
@@ -1727,7 +1727,7 @@
             <a:fld id="{B73B5F9C-F71A-419D-83AB-F48A1180A152}" type="datetimeFigureOut">
               <a:rPr lang="pt-BR" smtClean="0"/>
               <a:pPr/>
-              <a:t>04/10/2016</a:t>
+              <a:t>10/10/2016</a:t>
             </a:fld>
             <a:endParaRPr lang="pt-BR"/>
           </a:p>
@@ -2146,7 +2146,7 @@
             <a:fld id="{B73B5F9C-F71A-419D-83AB-F48A1180A152}" type="datetimeFigureOut">
               <a:rPr lang="pt-BR" smtClean="0"/>
               <a:pPr/>
-              <a:t>04/10/2016</a:t>
+              <a:t>10/10/2016</a:t>
             </a:fld>
             <a:endParaRPr lang="pt-BR"/>
           </a:p>
@@ -2261,7 +2261,7 @@
             <a:fld id="{B73B5F9C-F71A-419D-83AB-F48A1180A152}" type="datetimeFigureOut">
               <a:rPr lang="pt-BR" smtClean="0"/>
               <a:pPr/>
-              <a:t>04/10/2016</a:t>
+              <a:t>10/10/2016</a:t>
             </a:fld>
             <a:endParaRPr lang="pt-BR"/>
           </a:p>
@@ -2353,7 +2353,7 @@
             <a:fld id="{B73B5F9C-F71A-419D-83AB-F48A1180A152}" type="datetimeFigureOut">
               <a:rPr lang="pt-BR" smtClean="0"/>
               <a:pPr/>
-              <a:t>04/10/2016</a:t>
+              <a:t>10/10/2016</a:t>
             </a:fld>
             <a:endParaRPr lang="pt-BR"/>
           </a:p>
@@ -2627,7 +2627,7 @@
             <a:fld id="{B73B5F9C-F71A-419D-83AB-F48A1180A152}" type="datetimeFigureOut">
               <a:rPr lang="pt-BR" smtClean="0"/>
               <a:pPr/>
-              <a:t>04/10/2016</a:t>
+              <a:t>10/10/2016</a:t>
             </a:fld>
             <a:endParaRPr lang="pt-BR"/>
           </a:p>
@@ -2877,7 +2877,7 @@
             <a:fld id="{B73B5F9C-F71A-419D-83AB-F48A1180A152}" type="datetimeFigureOut">
               <a:rPr lang="pt-BR" smtClean="0"/>
               <a:pPr/>
-              <a:t>04/10/2016</a:t>
+              <a:t>10/10/2016</a:t>
             </a:fld>
             <a:endParaRPr lang="pt-BR"/>
           </a:p>
@@ -3087,7 +3087,7 @@
             <a:fld id="{B73B5F9C-F71A-419D-83AB-F48A1180A152}" type="datetimeFigureOut">
               <a:rPr lang="pt-BR" smtClean="0"/>
               <a:pPr/>
-              <a:t>04/10/2016</a:t>
+              <a:t>10/10/2016</a:t>
             </a:fld>
             <a:endParaRPr lang="pt-BR"/>
           </a:p>
@@ -3486,35 +3486,21 @@
                 <a:latin typeface="+mj-lt"/>
                 <a:cs typeface="Arial" pitchFamily="34" charset="0"/>
               </a:rPr>
-              <a:t>05 </a:t>
+              <a:t>10</a:t>
             </a:r>
             <a:r>
               <a:rPr lang="pt-BR" sz="2400" dirty="0" smtClean="0">
                 <a:latin typeface="+mj-lt"/>
                 <a:cs typeface="Arial" pitchFamily="34" charset="0"/>
               </a:rPr>
-              <a:t>de </a:t>
+              <a:t> </a:t>
             </a:r>
             <a:r>
               <a:rPr lang="pt-BR" sz="2400" dirty="0" smtClean="0">
                 <a:latin typeface="+mj-lt"/>
                 <a:cs typeface="Arial" pitchFamily="34" charset="0"/>
               </a:rPr>
-              <a:t>outubro </a:t>
-            </a:r>
-            <a:r>
-              <a:rPr lang="pt-BR" sz="2400" dirty="0" smtClean="0">
-                <a:latin typeface="+mj-lt"/>
-                <a:cs typeface="Arial" pitchFamily="34" charset="0"/>
-              </a:rPr>
-              <a:t>de </a:t>
-            </a:r>
-            <a:r>
-              <a:rPr lang="pt-BR" sz="2400" dirty="0" smtClean="0">
-                <a:latin typeface="+mj-lt"/>
-                <a:cs typeface="Arial" pitchFamily="34" charset="0"/>
-              </a:rPr>
-              <a:t>2016</a:t>
+              <a:t>de outubro de 2016</a:t>
             </a:r>
             <a:endParaRPr lang="pt-BR" sz="2400" dirty="0">
               <a:latin typeface="+mj-lt"/>
@@ -3791,6 +3777,11 @@
         </p:spPr>
       </p:pic>
     </p:spTree>
+    <p:extLst>
+      <p:ext uri="{BB962C8B-B14F-4D97-AF65-F5344CB8AC3E}">
+        <p14:creationId xmlns:p14="http://schemas.microsoft.com/office/powerpoint/2010/main" val="4153277913"/>
+      </p:ext>
+    </p:extLst>
   </p:cSld>
   <p:clrMapOvr>
     <a:masterClrMapping/>
@@ -11324,35 +11315,21 @@
                 <a:latin typeface="+mj-lt"/>
                 <a:cs typeface="Arial" pitchFamily="34" charset="0"/>
               </a:rPr>
-              <a:t>05 </a:t>
+              <a:t>10</a:t>
             </a:r>
             <a:r>
               <a:rPr lang="pt-BR" sz="2400" dirty="0" smtClean="0">
                 <a:latin typeface="+mj-lt"/>
                 <a:cs typeface="Arial" pitchFamily="34" charset="0"/>
               </a:rPr>
-              <a:t>de </a:t>
+              <a:t> </a:t>
             </a:r>
             <a:r>
               <a:rPr lang="pt-BR" sz="2400" dirty="0" smtClean="0">
                 <a:latin typeface="+mj-lt"/>
                 <a:cs typeface="Arial" pitchFamily="34" charset="0"/>
               </a:rPr>
-              <a:t>outubro </a:t>
-            </a:r>
-            <a:r>
-              <a:rPr lang="pt-BR" sz="2400" dirty="0" smtClean="0">
-                <a:latin typeface="+mj-lt"/>
-                <a:cs typeface="Arial" pitchFamily="34" charset="0"/>
-              </a:rPr>
-              <a:t>de </a:t>
-            </a:r>
-            <a:r>
-              <a:rPr lang="pt-BR" sz="2400" dirty="0" smtClean="0">
-                <a:latin typeface="+mj-lt"/>
-                <a:cs typeface="Arial" pitchFamily="34" charset="0"/>
-              </a:rPr>
-              <a:t>2016</a:t>
+              <a:t>de outubro de 2016</a:t>
             </a:r>
             <a:endParaRPr lang="pt-BR" sz="2400" dirty="0">
               <a:latin typeface="+mj-lt"/>

</xml_diff>